<commit_message>
adding some words to ppt
</commit_message>
<xml_diff>
--- a/CLR_via_CSharp/Week4/Ch5,6/Week4.pptx
+++ b/CLR_via_CSharp/Week4/Ch5,6/Week4.pptx
@@ -18,6 +18,7 @@
     <p:sldId id="269" r:id="rId12"/>
     <p:sldId id="270" r:id="rId13"/>
     <p:sldId id="271" r:id="rId14"/>
+    <p:sldId id="272" r:id="rId15"/>
   </p:sldIdLst>
   <p:sldSz cx="12192000" cy="6858000"/>
   <p:notesSz cx="6858000" cy="9144000"/>
@@ -3777,12 +3778,8 @@
               <a:buNone/>
             </a:pPr>
             <a:r>
-              <a:rPr lang="en-US"/>
-              <a:t>Compiler </a:t>
-            </a:r>
-            <a:r>
               <a:rPr lang="en-US" dirty="0"/>
-              <a:t>reads it as “combine before making the additive class/struct/int</a:t>
+              <a:t>Compiler reads it as “combine before making the additive class/struct/int</a:t>
             </a:r>
           </a:p>
         </p:txBody>
@@ -3830,6 +3827,487 @@
 </p:sld>
 </file>
 
+<file path=ppt/slides/slide14.xml><?xml version="1.0" encoding="utf-8"?>
+<p:sld xmlns:a="http://schemas.openxmlformats.org/drawingml/2006/main" xmlns:r="http://schemas.openxmlformats.org/officeDocument/2006/relationships" xmlns:p="http://schemas.openxmlformats.org/presentationml/2006/main">
+  <p:cSld>
+    <p:spTree>
+      <p:nvGrpSpPr>
+        <p:cNvPr id="1" name=""/>
+        <p:cNvGrpSpPr/>
+        <p:nvPr/>
+      </p:nvGrpSpPr>
+      <p:grpSpPr>
+        <a:xfrm>
+          <a:off x="0" y="0"/>
+          <a:ext cx="0" cy="0"/>
+          <a:chOff x="0" y="0"/>
+          <a:chExt cx="0" cy="0"/>
+        </a:xfrm>
+      </p:grpSpPr>
+      <p:sp>
+        <p:nvSpPr>
+          <p:cNvPr id="2" name="Title 1">
+            <a:extLst>
+              <a:ext uri="{FF2B5EF4-FFF2-40B4-BE49-F238E27FC236}">
+                <a16:creationId xmlns:a16="http://schemas.microsoft.com/office/drawing/2014/main" id="{E088E35D-321A-A146-6AD0-8E91E088D23B}"/>
+              </a:ext>
+            </a:extLst>
+          </p:cNvPr>
+          <p:cNvSpPr>
+            <a:spLocks noGrp="1"/>
+          </p:cNvSpPr>
+          <p:nvPr>
+            <p:ph type="title"/>
+          </p:nvPr>
+        </p:nvSpPr>
+        <p:spPr/>
+        <p:txBody>
+          <a:bodyPr/>
+          <a:lstStyle/>
+          <a:p>
+            <a:r>
+              <a:rPr lang="en-US" dirty="0"/>
+              <a:t>More </a:t>
+            </a:r>
+            <a:r>
+              <a:rPr lang="en-US" dirty="0" err="1"/>
+              <a:t>KEywords</a:t>
+            </a:r>
+            <a:endParaRPr lang="en-US" dirty="0"/>
+          </a:p>
+        </p:txBody>
+      </p:sp>
+      <p:graphicFrame>
+        <p:nvGraphicFramePr>
+          <p:cNvPr id="5" name="Table 5">
+            <a:extLst>
+              <a:ext uri="{FF2B5EF4-FFF2-40B4-BE49-F238E27FC236}">
+                <a16:creationId xmlns:a16="http://schemas.microsoft.com/office/drawing/2014/main" id="{4206900A-ABE4-B27F-0C7A-12B32C3F03CF}"/>
+              </a:ext>
+            </a:extLst>
+          </p:cNvPr>
+          <p:cNvGraphicFramePr>
+            <a:graphicFrameLocks noGrp="1"/>
+          </p:cNvGraphicFramePr>
+          <p:nvPr>
+            <p:ph idx="1"/>
+            <p:extLst>
+              <p:ext uri="{D42A27DB-BD31-4B8C-83A1-F6EECF244321}">
+                <p14:modId xmlns:p14="http://schemas.microsoft.com/office/powerpoint/2010/main" val="2896103440"/>
+              </p:ext>
+            </p:extLst>
+          </p:nvPr>
+        </p:nvGraphicFramePr>
+        <p:xfrm>
+          <a:off x="838200" y="1825625"/>
+          <a:ext cx="10515600" cy="3855720"/>
+        </p:xfrm>
+        <a:graphic>
+          <a:graphicData uri="http://schemas.openxmlformats.org/drawingml/2006/table">
+            <a:tbl>
+              <a:tblPr firstRow="1" bandRow="1">
+                <a:tableStyleId>{5C22544A-7EE6-4342-B048-85BDC9FD1C3A}</a:tableStyleId>
+              </a:tblPr>
+              <a:tblGrid>
+                <a:gridCol w="2628900">
+                  <a:extLst>
+                    <a:ext uri="{9D8B030D-6E8A-4147-A177-3AD203B41FA5}">
+                      <a16:colId xmlns:a16="http://schemas.microsoft.com/office/drawing/2014/main" val="1200011892"/>
+                    </a:ext>
+                  </a:extLst>
+                </a:gridCol>
+                <a:gridCol w="2628900">
+                  <a:extLst>
+                    <a:ext uri="{9D8B030D-6E8A-4147-A177-3AD203B41FA5}">
+                      <a16:colId xmlns:a16="http://schemas.microsoft.com/office/drawing/2014/main" val="1550014703"/>
+                    </a:ext>
+                  </a:extLst>
+                </a:gridCol>
+                <a:gridCol w="2628900">
+                  <a:extLst>
+                    <a:ext uri="{9D8B030D-6E8A-4147-A177-3AD203B41FA5}">
+                      <a16:colId xmlns:a16="http://schemas.microsoft.com/office/drawing/2014/main" val="4247614515"/>
+                    </a:ext>
+                  </a:extLst>
+                </a:gridCol>
+                <a:gridCol w="2628900">
+                  <a:extLst>
+                    <a:ext uri="{9D8B030D-6E8A-4147-A177-3AD203B41FA5}">
+                      <a16:colId xmlns:a16="http://schemas.microsoft.com/office/drawing/2014/main" val="2523389425"/>
+                    </a:ext>
+                  </a:extLst>
+                </a:gridCol>
+              </a:tblGrid>
+              <a:tr h="370840">
+                <a:tc>
+                  <a:txBody>
+                    <a:bodyPr/>
+                    <a:lstStyle/>
+                    <a:p>
+                      <a:r>
+                        <a:rPr lang="en-US" dirty="0"/>
+                        <a:t>C#</a:t>
+                      </a:r>
+                    </a:p>
+                  </a:txBody>
+                  <a:tcPr/>
+                </a:tc>
+                <a:tc>
+                  <a:txBody>
+                    <a:bodyPr/>
+                    <a:lstStyle/>
+                    <a:p>
+                      <a:r>
+                        <a:rPr lang="en-US" dirty="0"/>
+                        <a:t>Type</a:t>
+                      </a:r>
+                    </a:p>
+                  </a:txBody>
+                  <a:tcPr/>
+                </a:tc>
+                <a:tc>
+                  <a:txBody>
+                    <a:bodyPr/>
+                    <a:lstStyle/>
+                    <a:p>
+                      <a:r>
+                        <a:rPr lang="en-US" dirty="0"/>
+                        <a:t>Method/Prop/Event</a:t>
+                      </a:r>
+                    </a:p>
+                  </a:txBody>
+                  <a:tcPr/>
+                </a:tc>
+                <a:tc>
+                  <a:txBody>
+                    <a:bodyPr/>
+                    <a:lstStyle/>
+                    <a:p>
+                      <a:r>
+                        <a:rPr lang="en-US" dirty="0"/>
+                        <a:t>Constant/Field</a:t>
+                      </a:r>
+                    </a:p>
+                  </a:txBody>
+                  <a:tcPr/>
+                </a:tc>
+                <a:extLst>
+                  <a:ext uri="{0D108BD9-81ED-4DB2-BD59-A6C34878D82A}">
+                    <a16:rowId xmlns:a16="http://schemas.microsoft.com/office/drawing/2014/main" val="4184097763"/>
+                  </a:ext>
+                </a:extLst>
+              </a:tr>
+              <a:tr h="370840">
+                <a:tc>
+                  <a:txBody>
+                    <a:bodyPr/>
+                    <a:lstStyle/>
+                    <a:p>
+                      <a:r>
+                        <a:rPr lang="en-US" dirty="0"/>
+                        <a:t>Abstract</a:t>
+                      </a:r>
+                    </a:p>
+                  </a:txBody>
+                  <a:tcPr/>
+                </a:tc>
+                <a:tc>
+                  <a:txBody>
+                    <a:bodyPr/>
+                    <a:lstStyle/>
+                    <a:p>
+                      <a:r>
+                        <a:rPr lang="en-US" dirty="0"/>
+                        <a:t>No instances can be constructed</a:t>
+                      </a:r>
+                    </a:p>
+                  </a:txBody>
+                  <a:tcPr/>
+                </a:tc>
+                <a:tc>
+                  <a:txBody>
+                    <a:bodyPr/>
+                    <a:lstStyle/>
+                    <a:p>
+                      <a:r>
+                        <a:rPr lang="en-US" dirty="0"/>
+                        <a:t>Derived type must override/</a:t>
+                      </a:r>
+                      <a:r>
+                        <a:rPr lang="en-US" dirty="0" err="1"/>
+                        <a:t>implmenet</a:t>
+                      </a:r>
+                      <a:endParaRPr lang="en-US" dirty="0"/>
+                    </a:p>
+                  </a:txBody>
+                  <a:tcPr/>
+                </a:tc>
+                <a:tc>
+                  <a:txBody>
+                    <a:bodyPr/>
+                    <a:lstStyle/>
+                    <a:p>
+                      <a:r>
+                        <a:rPr lang="en-US" dirty="0"/>
+                        <a:t>Not allowed</a:t>
+                      </a:r>
+                    </a:p>
+                  </a:txBody>
+                  <a:tcPr/>
+                </a:tc>
+                <a:extLst>
+                  <a:ext uri="{0D108BD9-81ED-4DB2-BD59-A6C34878D82A}">
+                    <a16:rowId xmlns:a16="http://schemas.microsoft.com/office/drawing/2014/main" val="2437615275"/>
+                  </a:ext>
+                </a:extLst>
+              </a:tr>
+              <a:tr h="370840">
+                <a:tc>
+                  <a:txBody>
+                    <a:bodyPr/>
+                    <a:lstStyle/>
+                    <a:p>
+                      <a:r>
+                        <a:rPr lang="en-US" dirty="0"/>
+                        <a:t>Virtual</a:t>
+                      </a:r>
+                    </a:p>
+                  </a:txBody>
+                  <a:tcPr/>
+                </a:tc>
+                <a:tc>
+                  <a:txBody>
+                    <a:bodyPr/>
+                    <a:lstStyle/>
+                    <a:p>
+                      <a:r>
+                        <a:rPr lang="en-US" dirty="0"/>
+                        <a:t>Not allowed</a:t>
+                      </a:r>
+                    </a:p>
+                  </a:txBody>
+                  <a:tcPr/>
+                </a:tc>
+                <a:tc>
+                  <a:txBody>
+                    <a:bodyPr/>
+                    <a:lstStyle/>
+                    <a:p>
+                      <a:r>
+                        <a:rPr lang="en-US" dirty="0"/>
+                        <a:t>Can be overridden</a:t>
+                      </a:r>
+                    </a:p>
+                  </a:txBody>
+                  <a:tcPr/>
+                </a:tc>
+                <a:tc>
+                  <a:txBody>
+                    <a:bodyPr/>
+                    <a:lstStyle/>
+                    <a:p>
+                      <a:r>
+                        <a:rPr lang="en-US" dirty="0"/>
+                        <a:t>‘’</a:t>
+                      </a:r>
+                    </a:p>
+                  </a:txBody>
+                  <a:tcPr/>
+                </a:tc>
+                <a:extLst>
+                  <a:ext uri="{0D108BD9-81ED-4DB2-BD59-A6C34878D82A}">
+                    <a16:rowId xmlns:a16="http://schemas.microsoft.com/office/drawing/2014/main" val="1538427860"/>
+                  </a:ext>
+                </a:extLst>
+              </a:tr>
+              <a:tr h="370840">
+                <a:tc>
+                  <a:txBody>
+                    <a:bodyPr/>
+                    <a:lstStyle/>
+                    <a:p>
+                      <a:r>
+                        <a:rPr lang="en-US" dirty="0"/>
+                        <a:t>Override</a:t>
+                      </a:r>
+                    </a:p>
+                  </a:txBody>
+                  <a:tcPr/>
+                </a:tc>
+                <a:tc>
+                  <a:txBody>
+                    <a:bodyPr/>
+                    <a:lstStyle/>
+                    <a:p>
+                      <a:r>
+                        <a:rPr lang="en-US" dirty="0"/>
+                        <a:t>‘’</a:t>
+                      </a:r>
+                    </a:p>
+                  </a:txBody>
+                  <a:tcPr/>
+                </a:tc>
+                <a:tc>
+                  <a:txBody>
+                    <a:bodyPr/>
+                    <a:lstStyle/>
+                    <a:p>
+                      <a:r>
+                        <a:rPr lang="en-US" dirty="0"/>
+                        <a:t>Overrides base type</a:t>
+                      </a:r>
+                    </a:p>
+                  </a:txBody>
+                  <a:tcPr/>
+                </a:tc>
+                <a:tc>
+                  <a:txBody>
+                    <a:bodyPr/>
+                    <a:lstStyle/>
+                    <a:p>
+                      <a:r>
+                        <a:rPr lang="en-US" dirty="0"/>
+                        <a:t>‘’</a:t>
+                      </a:r>
+                    </a:p>
+                  </a:txBody>
+                  <a:tcPr/>
+                </a:tc>
+                <a:extLst>
+                  <a:ext uri="{0D108BD9-81ED-4DB2-BD59-A6C34878D82A}">
+                    <a16:rowId xmlns:a16="http://schemas.microsoft.com/office/drawing/2014/main" val="3191214760"/>
+                  </a:ext>
+                </a:extLst>
+              </a:tr>
+              <a:tr h="370840">
+                <a:tc>
+                  <a:txBody>
+                    <a:bodyPr/>
+                    <a:lstStyle/>
+                    <a:p>
+                      <a:r>
+                        <a:rPr lang="en-US" dirty="0"/>
+                        <a:t>Sealed</a:t>
+                      </a:r>
+                    </a:p>
+                  </a:txBody>
+                  <a:tcPr/>
+                </a:tc>
+                <a:tc>
+                  <a:txBody>
+                    <a:bodyPr/>
+                    <a:lstStyle/>
+                    <a:p>
+                      <a:r>
+                        <a:rPr lang="en-US" dirty="0"/>
+                        <a:t>Cannot be used as a base type</a:t>
+                      </a:r>
+                    </a:p>
+                  </a:txBody>
+                  <a:tcPr/>
+                </a:tc>
+                <a:tc>
+                  <a:txBody>
+                    <a:bodyPr/>
+                    <a:lstStyle/>
+                    <a:p>
+                      <a:r>
+                        <a:rPr lang="en-US" dirty="0"/>
+                        <a:t>Can’t be overridden</a:t>
+                      </a:r>
+                    </a:p>
+                  </a:txBody>
+                  <a:tcPr/>
+                </a:tc>
+                <a:tc>
+                  <a:txBody>
+                    <a:bodyPr/>
+                    <a:lstStyle/>
+                    <a:p>
+                      <a:r>
+                        <a:rPr lang="en-US" dirty="0"/>
+                        <a:t>‘’</a:t>
+                      </a:r>
+                    </a:p>
+                  </a:txBody>
+                  <a:tcPr/>
+                </a:tc>
+                <a:extLst>
+                  <a:ext uri="{0D108BD9-81ED-4DB2-BD59-A6C34878D82A}">
+                    <a16:rowId xmlns:a16="http://schemas.microsoft.com/office/drawing/2014/main" val="1312868338"/>
+                  </a:ext>
+                </a:extLst>
+              </a:tr>
+              <a:tr h="370840">
+                <a:tc>
+                  <a:txBody>
+                    <a:bodyPr/>
+                    <a:lstStyle/>
+                    <a:p>
+                      <a:r>
+                        <a:rPr lang="en-US" dirty="0"/>
+                        <a:t>New</a:t>
+                      </a:r>
+                    </a:p>
+                  </a:txBody>
+                  <a:tcPr/>
+                </a:tc>
+                <a:tc>
+                  <a:txBody>
+                    <a:bodyPr/>
+                    <a:lstStyle/>
+                    <a:p>
+                      <a:r>
+                        <a:rPr lang="en-US" dirty="0"/>
+                        <a:t>When applied to something, , the member has no relationship to anything in the base/parent class</a:t>
+                      </a:r>
+                    </a:p>
+                  </a:txBody>
+                  <a:tcPr/>
+                </a:tc>
+                <a:tc>
+                  <a:txBody>
+                    <a:bodyPr/>
+                    <a:lstStyle/>
+                    <a:p>
+                      <a:endParaRPr lang="en-US" dirty="0"/>
+                    </a:p>
+                  </a:txBody>
+                  <a:tcPr/>
+                </a:tc>
+                <a:tc>
+                  <a:txBody>
+                    <a:bodyPr/>
+                    <a:lstStyle/>
+                    <a:p>
+                      <a:endParaRPr lang="en-US" dirty="0"/>
+                    </a:p>
+                  </a:txBody>
+                  <a:tcPr/>
+                </a:tc>
+                <a:extLst>
+                  <a:ext uri="{0D108BD9-81ED-4DB2-BD59-A6C34878D82A}">
+                    <a16:rowId xmlns:a16="http://schemas.microsoft.com/office/drawing/2014/main" val="2742111472"/>
+                  </a:ext>
+                </a:extLst>
+              </a:tr>
+            </a:tbl>
+          </a:graphicData>
+        </a:graphic>
+      </p:graphicFrame>
+    </p:spTree>
+    <p:extLst>
+      <p:ext uri="{BB962C8B-B14F-4D97-AF65-F5344CB8AC3E}">
+        <p14:creationId xmlns:p14="http://schemas.microsoft.com/office/powerpoint/2010/main" val="2430579519"/>
+      </p:ext>
+    </p:extLst>
+  </p:cSld>
+  <p:clrMapOvr>
+    <a:masterClrMapping/>
+  </p:clrMapOvr>
+</p:sld>
+</file>
+
 <file path=ppt/slides/slide2.xml><?xml version="1.0" encoding="utf-8"?>
 <p:sld xmlns:a="http://schemas.openxmlformats.org/drawingml/2006/main" xmlns:r="http://schemas.openxmlformats.org/officeDocument/2006/relationships" xmlns:p="http://schemas.openxmlformats.org/presentationml/2006/main">
   <p:cSld>
@@ -3913,23 +4391,6 @@
               <a:rPr lang="en-US" dirty="0"/>
               <a:t>Keywords galore</a:t>
             </a:r>
-          </a:p>
-          <a:p>
-            <a:r>
-              <a:rPr lang="en-US" dirty="0"/>
-              <a:t>Some  stuff that’s popped up</a:t>
-            </a:r>
-          </a:p>
-          <a:p>
-            <a:pPr lvl="1"/>
-            <a:r>
-              <a:rPr lang="en-US" dirty="0"/>
-              <a:t>GAC</a:t>
-            </a:r>
-          </a:p>
-          <a:p>
-            <a:pPr lvl="1"/>
-            <a:endParaRPr lang="en-US" dirty="0"/>
           </a:p>
           <a:p>
             <a:endParaRPr lang="en-US" dirty="0"/>

</xml_diff>

<commit_message>
commit for session 4
</commit_message>
<xml_diff>
--- a/CLR_via_CSharp/Week4/Ch5,6/Week4.pptx
+++ b/CLR_via_CSharp/Week4/Ch5,6/Week4.pptx
@@ -19,6 +19,10 @@
     <p:sldId id="270" r:id="rId13"/>
     <p:sldId id="271" r:id="rId14"/>
     <p:sldId id="272" r:id="rId15"/>
+    <p:sldId id="273" r:id="rId16"/>
+    <p:sldId id="274" r:id="rId17"/>
+    <p:sldId id="275" r:id="rId18"/>
+    <p:sldId id="276" r:id="rId19"/>
   </p:sldIdLst>
   <p:sldSz cx="12192000" cy="6858000"/>
   <p:notesSz cx="6858000" cy="9144000"/>
@@ -3009,7 +3013,7 @@
           <a:p>
             <a:r>
               <a:rPr lang="en-US" dirty="0"/>
-              <a:t>Chapter 6 and pieces</a:t>
+              <a:t>Chapter 6 and 7</a:t>
             </a:r>
           </a:p>
         </p:txBody>
@@ -3867,13 +3871,8 @@
           <a:p>
             <a:r>
               <a:rPr lang="en-US" dirty="0"/>
-              <a:t>More </a:t>
-            </a:r>
-            <a:r>
-              <a:rPr lang="en-US" dirty="0" err="1"/>
-              <a:t>KEywords</a:t>
-            </a:r>
-            <a:endParaRPr lang="en-US" dirty="0"/>
+              <a:t>More Keywords</a:t>
+            </a:r>
           </a:p>
         </p:txBody>
       </p:sp>
@@ -3893,7 +3892,7 @@
             <p:ph idx="1"/>
             <p:extLst>
               <p:ext uri="{D42A27DB-BD31-4B8C-83A1-F6EECF244321}">
-                <p14:modId xmlns:p14="http://schemas.microsoft.com/office/powerpoint/2010/main" val="2896103440"/>
+                <p14:modId xmlns:p14="http://schemas.microsoft.com/office/powerpoint/2010/main" val="2048631053"/>
               </p:ext>
             </p:extLst>
           </p:nvPr>
@@ -4031,13 +4030,8 @@
                     <a:p>
                       <a:r>
                         <a:rPr lang="en-US" dirty="0"/>
-                        <a:t>Derived type must override/</a:t>
+                        <a:t>Derived type must override/implement</a:t>
                       </a:r>
-                      <a:r>
-                        <a:rPr lang="en-US" dirty="0" err="1"/>
-                        <a:t>implmenet</a:t>
-                      </a:r>
-                      <a:endParaRPr lang="en-US" dirty="0"/>
                     </a:p>
                   </a:txBody>
                   <a:tcPr/>
@@ -4299,6 +4293,753 @@
     <p:extLst>
       <p:ext uri="{BB962C8B-B14F-4D97-AF65-F5344CB8AC3E}">
         <p14:creationId xmlns:p14="http://schemas.microsoft.com/office/powerpoint/2010/main" val="2430579519"/>
+      </p:ext>
+    </p:extLst>
+  </p:cSld>
+  <p:clrMapOvr>
+    <a:masterClrMapping/>
+  </p:clrMapOvr>
+</p:sld>
+</file>
+
+<file path=ppt/slides/slide15.xml><?xml version="1.0" encoding="utf-8"?>
+<p:sld xmlns:a="http://schemas.openxmlformats.org/drawingml/2006/main" xmlns:r="http://schemas.openxmlformats.org/officeDocument/2006/relationships" xmlns:p="http://schemas.openxmlformats.org/presentationml/2006/main">
+  <p:cSld>
+    <p:spTree>
+      <p:nvGrpSpPr>
+        <p:cNvPr id="1" name=""/>
+        <p:cNvGrpSpPr/>
+        <p:nvPr/>
+      </p:nvGrpSpPr>
+      <p:grpSpPr>
+        <a:xfrm>
+          <a:off x="0" y="0"/>
+          <a:ext cx="0" cy="0"/>
+          <a:chOff x="0" y="0"/>
+          <a:chExt cx="0" cy="0"/>
+        </a:xfrm>
+      </p:grpSpPr>
+      <p:sp>
+        <p:nvSpPr>
+          <p:cNvPr id="2" name="Title 1">
+            <a:extLst>
+              <a:ext uri="{FF2B5EF4-FFF2-40B4-BE49-F238E27FC236}">
+                <a16:creationId xmlns:a16="http://schemas.microsoft.com/office/drawing/2014/main" id="{D670BD2A-43F9-7705-F4AE-5A42C076EED0}"/>
+              </a:ext>
+            </a:extLst>
+          </p:cNvPr>
+          <p:cNvSpPr>
+            <a:spLocks noGrp="1"/>
+          </p:cNvSpPr>
+          <p:nvPr>
+            <p:ph type="title"/>
+          </p:nvPr>
+        </p:nvSpPr>
+        <p:spPr/>
+        <p:txBody>
+          <a:bodyPr/>
+          <a:lstStyle/>
+          <a:p>
+            <a:r>
+              <a:rPr lang="en-US" dirty="0"/>
+              <a:t>Jeff, IL, and virtual</a:t>
+            </a:r>
+          </a:p>
+        </p:txBody>
+      </p:sp>
+      <p:sp>
+        <p:nvSpPr>
+          <p:cNvPr id="3" name="Content Placeholder 2">
+            <a:extLst>
+              <a:ext uri="{FF2B5EF4-FFF2-40B4-BE49-F238E27FC236}">
+                <a16:creationId xmlns:a16="http://schemas.microsoft.com/office/drawing/2014/main" id="{FCF78104-7730-25BD-7D8D-0C0F9A6E2E3E}"/>
+              </a:ext>
+            </a:extLst>
+          </p:cNvPr>
+          <p:cNvSpPr>
+            <a:spLocks noGrp="1"/>
+          </p:cNvSpPr>
+          <p:nvPr>
+            <p:ph idx="1"/>
+          </p:nvPr>
+        </p:nvSpPr>
+        <p:spPr/>
+        <p:txBody>
+          <a:bodyPr/>
+          <a:lstStyle/>
+          <a:p>
+            <a:pPr marL="0" indent="0">
+              <a:buNone/>
+            </a:pPr>
+            <a:r>
+              <a:rPr lang="en-US" dirty="0"/>
+              <a:t>There is a section dedicated to how call IL calls static, instance, and virtual methods with “call”</a:t>
+            </a:r>
+          </a:p>
+          <a:p>
+            <a:pPr marL="0" indent="0">
+              <a:buNone/>
+            </a:pPr>
+            <a:r>
+              <a:rPr lang="en-US" dirty="0"/>
+              <a:t>-- assumption that the value is not null</a:t>
+            </a:r>
+          </a:p>
+          <a:p>
+            <a:pPr marL="0" indent="0">
+              <a:buNone/>
+            </a:pPr>
+            <a:endParaRPr lang="en-US" dirty="0"/>
+          </a:p>
+          <a:p>
+            <a:pPr marL="0" indent="0">
+              <a:buNone/>
+            </a:pPr>
+            <a:r>
+              <a:rPr lang="en-US" dirty="0"/>
+              <a:t>“</a:t>
+            </a:r>
+            <a:r>
+              <a:rPr lang="en-US" dirty="0" err="1"/>
+              <a:t>callVirt</a:t>
+            </a:r>
+            <a:r>
+              <a:rPr lang="en-US" dirty="0"/>
+              <a:t>” has to have an object, can’t be used on static variables.</a:t>
+            </a:r>
+            <a:br>
+              <a:rPr lang="en-US" dirty="0"/>
+            </a:br>
+            <a:r>
+              <a:rPr lang="en-US" dirty="0"/>
+              <a:t> on the other hand. This has a tighter check and the value it’s being called on must not be null </a:t>
+            </a:r>
+            <a:r>
+              <a:rPr lang="en-US" dirty="0">
+                <a:sym typeface="Wingdings" panose="05000000000000000000" pitchFamily="2" charset="2"/>
+              </a:rPr>
+              <a:t> perhaps something to think about at scale?</a:t>
+            </a:r>
+            <a:endParaRPr lang="en-US" dirty="0"/>
+          </a:p>
+        </p:txBody>
+      </p:sp>
+    </p:spTree>
+    <p:extLst>
+      <p:ext uri="{BB962C8B-B14F-4D97-AF65-F5344CB8AC3E}">
+        <p14:creationId xmlns:p14="http://schemas.microsoft.com/office/powerpoint/2010/main" val="735906582"/>
+      </p:ext>
+    </p:extLst>
+  </p:cSld>
+  <p:clrMapOvr>
+    <a:masterClrMapping/>
+  </p:clrMapOvr>
+</p:sld>
+</file>
+
+<file path=ppt/slides/slide16.xml><?xml version="1.0" encoding="utf-8"?>
+<p:sld xmlns:a="http://schemas.openxmlformats.org/drawingml/2006/main" xmlns:r="http://schemas.openxmlformats.org/officeDocument/2006/relationships" xmlns:p="http://schemas.openxmlformats.org/presentationml/2006/main">
+  <p:cSld>
+    <p:spTree>
+      <p:nvGrpSpPr>
+        <p:cNvPr id="1" name=""/>
+        <p:cNvGrpSpPr/>
+        <p:nvPr/>
+      </p:nvGrpSpPr>
+      <p:grpSpPr>
+        <a:xfrm>
+          <a:off x="0" y="0"/>
+          <a:ext cx="0" cy="0"/>
+          <a:chOff x="0" y="0"/>
+          <a:chExt cx="0" cy="0"/>
+        </a:xfrm>
+      </p:grpSpPr>
+      <p:sp>
+        <p:nvSpPr>
+          <p:cNvPr id="2" name="Title 1">
+            <a:extLst>
+              <a:ext uri="{FF2B5EF4-FFF2-40B4-BE49-F238E27FC236}">
+                <a16:creationId xmlns:a16="http://schemas.microsoft.com/office/drawing/2014/main" id="{32BDA4D8-8E14-0F69-2FF0-1938C02B8292}"/>
+              </a:ext>
+            </a:extLst>
+          </p:cNvPr>
+          <p:cNvSpPr>
+            <a:spLocks noGrp="1"/>
+          </p:cNvSpPr>
+          <p:nvPr>
+            <p:ph type="title"/>
+          </p:nvPr>
+        </p:nvSpPr>
+        <p:spPr/>
+        <p:txBody>
+          <a:bodyPr/>
+          <a:lstStyle/>
+          <a:p>
+            <a:r>
+              <a:rPr lang="en-US" dirty="0"/>
+              <a:t>Jeff’s best practices for a safer typed world</a:t>
+            </a:r>
+          </a:p>
+        </p:txBody>
+      </p:sp>
+      <p:sp>
+        <p:nvSpPr>
+          <p:cNvPr id="3" name="Content Placeholder 2">
+            <a:extLst>
+              <a:ext uri="{FF2B5EF4-FFF2-40B4-BE49-F238E27FC236}">
+                <a16:creationId xmlns:a16="http://schemas.microsoft.com/office/drawing/2014/main" id="{02EB5047-359A-484F-2F2B-C81AF4C11DA2}"/>
+              </a:ext>
+            </a:extLst>
+          </p:cNvPr>
+          <p:cNvSpPr>
+            <a:spLocks noGrp="1"/>
+          </p:cNvSpPr>
+          <p:nvPr>
+            <p:ph idx="1"/>
+          </p:nvPr>
+        </p:nvSpPr>
+        <p:spPr/>
+        <p:txBody>
+          <a:bodyPr/>
+          <a:lstStyle/>
+          <a:p>
+            <a:r>
+              <a:rPr lang="en-US" dirty="0" err="1"/>
+              <a:t>Explictly</a:t>
+            </a:r>
+            <a:r>
+              <a:rPr lang="en-US" dirty="0"/>
+              <a:t> make classes sealed unless it’s meant to be derived later</a:t>
+            </a:r>
+          </a:p>
+          <a:p>
+            <a:pPr lvl="1"/>
+            <a:r>
+              <a:rPr lang="en-US" dirty="0"/>
+              <a:t>In </a:t>
+            </a:r>
+            <a:r>
+              <a:rPr lang="en-US" dirty="0" err="1"/>
+              <a:t>CSharpChess</a:t>
+            </a:r>
+            <a:r>
+              <a:rPr lang="en-US" dirty="0"/>
+              <a:t>, the class for piece could be sealed?</a:t>
+            </a:r>
+          </a:p>
+          <a:p>
+            <a:r>
+              <a:rPr lang="en-US" dirty="0"/>
+              <a:t>Make data fields explicitly private</a:t>
+            </a:r>
+          </a:p>
+          <a:p>
+            <a:r>
+              <a:rPr lang="en-US" dirty="0"/>
+              <a:t>Make methods, props, and events inside of a class explicitly private as well</a:t>
+            </a:r>
+          </a:p>
+          <a:p>
+            <a:r>
+              <a:rPr lang="en-US" dirty="0"/>
+              <a:t>When things are complicated “make more types”</a:t>
+            </a:r>
+          </a:p>
+        </p:txBody>
+      </p:sp>
+    </p:spTree>
+    <p:extLst>
+      <p:ext uri="{BB962C8B-B14F-4D97-AF65-F5344CB8AC3E}">
+        <p14:creationId xmlns:p14="http://schemas.microsoft.com/office/powerpoint/2010/main" val="2624575273"/>
+      </p:ext>
+    </p:extLst>
+  </p:cSld>
+  <p:clrMapOvr>
+    <a:masterClrMapping/>
+  </p:clrMapOvr>
+</p:sld>
+</file>
+
+<file path=ppt/slides/slide17.xml><?xml version="1.0" encoding="utf-8"?>
+<p:sld xmlns:a="http://schemas.openxmlformats.org/drawingml/2006/main" xmlns:r="http://schemas.openxmlformats.org/officeDocument/2006/relationships" xmlns:p="http://schemas.openxmlformats.org/presentationml/2006/main">
+  <p:cSld>
+    <p:spTree>
+      <p:nvGrpSpPr>
+        <p:cNvPr id="1" name=""/>
+        <p:cNvGrpSpPr/>
+        <p:nvPr/>
+      </p:nvGrpSpPr>
+      <p:grpSpPr>
+        <a:xfrm>
+          <a:off x="0" y="0"/>
+          <a:ext cx="0" cy="0"/>
+          <a:chOff x="0" y="0"/>
+          <a:chExt cx="0" cy="0"/>
+        </a:xfrm>
+      </p:grpSpPr>
+      <p:sp>
+        <p:nvSpPr>
+          <p:cNvPr id="2" name="Title 1">
+            <a:extLst>
+              <a:ext uri="{FF2B5EF4-FFF2-40B4-BE49-F238E27FC236}">
+                <a16:creationId xmlns:a16="http://schemas.microsoft.com/office/drawing/2014/main" id="{675E29A6-4387-8A02-8229-1D171D5F9077}"/>
+              </a:ext>
+            </a:extLst>
+          </p:cNvPr>
+          <p:cNvSpPr>
+            <a:spLocks noGrp="1"/>
+          </p:cNvSpPr>
+          <p:nvPr>
+            <p:ph type="title"/>
+          </p:nvPr>
+        </p:nvSpPr>
+        <p:spPr/>
+        <p:txBody>
+          <a:bodyPr/>
+          <a:lstStyle/>
+          <a:p>
+            <a:r>
+              <a:rPr lang="en-US" dirty="0"/>
+              <a:t>Constants</a:t>
+            </a:r>
+          </a:p>
+        </p:txBody>
+      </p:sp>
+      <p:sp>
+        <p:nvSpPr>
+          <p:cNvPr id="3" name="Content Placeholder 2">
+            <a:extLst>
+              <a:ext uri="{FF2B5EF4-FFF2-40B4-BE49-F238E27FC236}">
+                <a16:creationId xmlns:a16="http://schemas.microsoft.com/office/drawing/2014/main" id="{AD593E02-AF7A-A226-E2C4-DF35661D9FB3}"/>
+              </a:ext>
+            </a:extLst>
+          </p:cNvPr>
+          <p:cNvSpPr>
+            <a:spLocks noGrp="1"/>
+          </p:cNvSpPr>
+          <p:nvPr>
+            <p:ph idx="1"/>
+          </p:nvPr>
+        </p:nvSpPr>
+        <p:spPr/>
+        <p:txBody>
+          <a:bodyPr/>
+          <a:lstStyle/>
+          <a:p>
+            <a:r>
+              <a:rPr lang="en-US" dirty="0"/>
+              <a:t>Implicitly static already,</a:t>
+            </a:r>
+          </a:p>
+        </p:txBody>
+      </p:sp>
+      <p:graphicFrame>
+        <p:nvGraphicFramePr>
+          <p:cNvPr id="4" name="Table 4">
+            <a:extLst>
+              <a:ext uri="{FF2B5EF4-FFF2-40B4-BE49-F238E27FC236}">
+                <a16:creationId xmlns:a16="http://schemas.microsoft.com/office/drawing/2014/main" id="{22D25E9F-C739-AA8B-8012-CF5826DC6F4F}"/>
+              </a:ext>
+            </a:extLst>
+          </p:cNvPr>
+          <p:cNvGraphicFramePr>
+            <a:graphicFrameLocks noGrp="1"/>
+          </p:cNvGraphicFramePr>
+          <p:nvPr>
+            <p:extLst>
+              <p:ext uri="{D42A27DB-BD31-4B8C-83A1-F6EECF244321}">
+                <p14:modId xmlns:p14="http://schemas.microsoft.com/office/powerpoint/2010/main" val="2538137870"/>
+              </p:ext>
+            </p:extLst>
+          </p:nvPr>
+        </p:nvGraphicFramePr>
+        <p:xfrm>
+          <a:off x="2032000" y="2893798"/>
+          <a:ext cx="8127999" cy="2661920"/>
+        </p:xfrm>
+        <a:graphic>
+          <a:graphicData uri="http://schemas.openxmlformats.org/drawingml/2006/table">
+            <a:tbl>
+              <a:tblPr firstRow="1" bandRow="1">
+                <a:tableStyleId>{5C22544A-7EE6-4342-B048-85BDC9FD1C3A}</a:tableStyleId>
+              </a:tblPr>
+              <a:tblGrid>
+                <a:gridCol w="2709333">
+                  <a:extLst>
+                    <a:ext uri="{9D8B030D-6E8A-4147-A177-3AD203B41FA5}">
+                      <a16:colId xmlns:a16="http://schemas.microsoft.com/office/drawing/2014/main" val="888452090"/>
+                    </a:ext>
+                  </a:extLst>
+                </a:gridCol>
+                <a:gridCol w="2709333">
+                  <a:extLst>
+                    <a:ext uri="{9D8B030D-6E8A-4147-A177-3AD203B41FA5}">
+                      <a16:colId xmlns:a16="http://schemas.microsoft.com/office/drawing/2014/main" val="1357123284"/>
+                    </a:ext>
+                  </a:extLst>
+                </a:gridCol>
+                <a:gridCol w="2709333">
+                  <a:extLst>
+                    <a:ext uri="{9D8B030D-6E8A-4147-A177-3AD203B41FA5}">
+                      <a16:colId xmlns:a16="http://schemas.microsoft.com/office/drawing/2014/main" val="1084591028"/>
+                    </a:ext>
+                  </a:extLst>
+                </a:gridCol>
+              </a:tblGrid>
+              <a:tr h="370840">
+                <a:tc>
+                  <a:txBody>
+                    <a:bodyPr/>
+                    <a:lstStyle/>
+                    <a:p>
+                      <a:r>
+                        <a:rPr lang="en-US" dirty="0"/>
+                        <a:t>CLR</a:t>
+                      </a:r>
+                    </a:p>
+                  </a:txBody>
+                  <a:tcPr/>
+                </a:tc>
+                <a:tc>
+                  <a:txBody>
+                    <a:bodyPr/>
+                    <a:lstStyle/>
+                    <a:p>
+                      <a:r>
+                        <a:rPr lang="en-US" dirty="0"/>
+                        <a:t>C#</a:t>
+                      </a:r>
+                    </a:p>
+                  </a:txBody>
+                  <a:tcPr/>
+                </a:tc>
+                <a:tc>
+                  <a:txBody>
+                    <a:bodyPr/>
+                    <a:lstStyle/>
+                    <a:p>
+                      <a:r>
+                        <a:rPr lang="en-US" dirty="0"/>
+                        <a:t>Desc</a:t>
+                      </a:r>
+                    </a:p>
+                  </a:txBody>
+                  <a:tcPr/>
+                </a:tc>
+                <a:extLst>
+                  <a:ext uri="{0D108BD9-81ED-4DB2-BD59-A6C34878D82A}">
+                    <a16:rowId xmlns:a16="http://schemas.microsoft.com/office/drawing/2014/main" val="1018882262"/>
+                  </a:ext>
+                </a:extLst>
+              </a:tr>
+              <a:tr h="370840">
+                <a:tc>
+                  <a:txBody>
+                    <a:bodyPr/>
+                    <a:lstStyle/>
+                    <a:p>
+                      <a:r>
+                        <a:rPr lang="en-US" dirty="0"/>
+                        <a:t>Static</a:t>
+                      </a:r>
+                    </a:p>
+                  </a:txBody>
+                  <a:tcPr/>
+                </a:tc>
+                <a:tc>
+                  <a:txBody>
+                    <a:bodyPr/>
+                    <a:lstStyle/>
+                    <a:p>
+                      <a:r>
+                        <a:rPr lang="en-US" dirty="0"/>
+                        <a:t>Static</a:t>
+                      </a:r>
+                    </a:p>
+                  </a:txBody>
+                  <a:tcPr/>
+                </a:tc>
+                <a:tc>
+                  <a:txBody>
+                    <a:bodyPr/>
+                    <a:lstStyle/>
+                    <a:p>
+                      <a:r>
+                        <a:rPr lang="en-US" dirty="0"/>
+                        <a:t>Belongs to type’s state</a:t>
+                      </a:r>
+                    </a:p>
+                  </a:txBody>
+                  <a:tcPr/>
+                </a:tc>
+                <a:extLst>
+                  <a:ext uri="{0D108BD9-81ED-4DB2-BD59-A6C34878D82A}">
+                    <a16:rowId xmlns:a16="http://schemas.microsoft.com/office/drawing/2014/main" val="491349338"/>
+                  </a:ext>
+                </a:extLst>
+              </a:tr>
+              <a:tr h="370840">
+                <a:tc>
+                  <a:txBody>
+                    <a:bodyPr/>
+                    <a:lstStyle/>
+                    <a:p>
+                      <a:r>
+                        <a:rPr lang="en-US" dirty="0"/>
+                        <a:t>Instance</a:t>
+                      </a:r>
+                    </a:p>
+                  </a:txBody>
+                  <a:tcPr/>
+                </a:tc>
+                <a:tc>
+                  <a:txBody>
+                    <a:bodyPr/>
+                    <a:lstStyle/>
+                    <a:p>
+                      <a:r>
+                        <a:rPr lang="en-US" dirty="0"/>
+                        <a:t>Default</a:t>
+                      </a:r>
+                    </a:p>
+                  </a:txBody>
+                  <a:tcPr/>
+                </a:tc>
+                <a:tc>
+                  <a:txBody>
+                    <a:bodyPr/>
+                    <a:lstStyle/>
+                    <a:p>
+                      <a:r>
+                        <a:rPr lang="en-US" dirty="0"/>
+                        <a:t>Belongs to instance of a type</a:t>
+                      </a:r>
+                    </a:p>
+                  </a:txBody>
+                  <a:tcPr/>
+                </a:tc>
+                <a:extLst>
+                  <a:ext uri="{0D108BD9-81ED-4DB2-BD59-A6C34878D82A}">
+                    <a16:rowId xmlns:a16="http://schemas.microsoft.com/office/drawing/2014/main" val="4275167732"/>
+                  </a:ext>
+                </a:extLst>
+              </a:tr>
+              <a:tr h="370840">
+                <a:tc>
+                  <a:txBody>
+                    <a:bodyPr/>
+                    <a:lstStyle/>
+                    <a:p>
+                      <a:r>
+                        <a:rPr lang="en-US" dirty="0" err="1"/>
+                        <a:t>Initonly</a:t>
+                      </a:r>
+                      <a:endParaRPr lang="en-US" dirty="0"/>
+                    </a:p>
+                  </a:txBody>
+                  <a:tcPr/>
+                </a:tc>
+                <a:tc>
+                  <a:txBody>
+                    <a:bodyPr/>
+                    <a:lstStyle/>
+                    <a:p>
+                      <a:r>
+                        <a:rPr lang="en-US" dirty="0" err="1"/>
+                        <a:t>Readonly</a:t>
+                      </a:r>
+                      <a:endParaRPr lang="en-US" dirty="0"/>
+                    </a:p>
+                  </a:txBody>
+                  <a:tcPr/>
+                </a:tc>
+                <a:tc>
+                  <a:txBody>
+                    <a:bodyPr/>
+                    <a:lstStyle/>
+                    <a:p>
+                      <a:r>
+                        <a:rPr lang="en-US" dirty="0"/>
+                        <a:t>Can only be written to in </a:t>
+                      </a:r>
+                      <a:r>
+                        <a:rPr lang="en-US" dirty="0" err="1"/>
+                        <a:t>ctors</a:t>
+                      </a:r>
+                      <a:endParaRPr lang="en-US" dirty="0"/>
+                    </a:p>
+                  </a:txBody>
+                  <a:tcPr/>
+                </a:tc>
+                <a:extLst>
+                  <a:ext uri="{0D108BD9-81ED-4DB2-BD59-A6C34878D82A}">
+                    <a16:rowId xmlns:a16="http://schemas.microsoft.com/office/drawing/2014/main" val="1923648797"/>
+                  </a:ext>
+                </a:extLst>
+              </a:tr>
+              <a:tr h="370840">
+                <a:tc>
+                  <a:txBody>
+                    <a:bodyPr/>
+                    <a:lstStyle/>
+                    <a:p>
+                      <a:r>
+                        <a:rPr lang="en-US" dirty="0"/>
+                        <a:t>Volatile</a:t>
+                      </a:r>
+                    </a:p>
+                  </a:txBody>
+                  <a:tcPr/>
+                </a:tc>
+                <a:tc>
+                  <a:txBody>
+                    <a:bodyPr/>
+                    <a:lstStyle/>
+                    <a:p>
+                      <a:r>
+                        <a:rPr lang="en-US" dirty="0"/>
+                        <a:t>Volatile</a:t>
+                      </a:r>
+                    </a:p>
+                  </a:txBody>
+                  <a:tcPr/>
+                </a:tc>
+                <a:tc>
+                  <a:txBody>
+                    <a:bodyPr/>
+                    <a:lstStyle/>
+                    <a:p>
+                      <a:r>
+                        <a:rPr lang="en-US" dirty="0"/>
+                        <a:t>Not subject to thread unsafe optimizations</a:t>
+                      </a:r>
+                    </a:p>
+                  </a:txBody>
+                  <a:tcPr/>
+                </a:tc>
+                <a:extLst>
+                  <a:ext uri="{0D108BD9-81ED-4DB2-BD59-A6C34878D82A}">
+                    <a16:rowId xmlns:a16="http://schemas.microsoft.com/office/drawing/2014/main" val="189532978"/>
+                  </a:ext>
+                </a:extLst>
+              </a:tr>
+            </a:tbl>
+          </a:graphicData>
+        </a:graphic>
+      </p:graphicFrame>
+    </p:spTree>
+    <p:extLst>
+      <p:ext uri="{BB962C8B-B14F-4D97-AF65-F5344CB8AC3E}">
+        <p14:creationId xmlns:p14="http://schemas.microsoft.com/office/powerpoint/2010/main" val="314580003"/>
+      </p:ext>
+    </p:extLst>
+  </p:cSld>
+  <p:clrMapOvr>
+    <a:masterClrMapping/>
+  </p:clrMapOvr>
+</p:sld>
+</file>
+
+<file path=ppt/slides/slide18.xml><?xml version="1.0" encoding="utf-8"?>
+<p:sld xmlns:a="http://schemas.openxmlformats.org/drawingml/2006/main" xmlns:r="http://schemas.openxmlformats.org/officeDocument/2006/relationships" xmlns:p="http://schemas.openxmlformats.org/presentationml/2006/main">
+  <p:cSld>
+    <p:spTree>
+      <p:nvGrpSpPr>
+        <p:cNvPr id="1" name=""/>
+        <p:cNvGrpSpPr/>
+        <p:nvPr/>
+      </p:nvGrpSpPr>
+      <p:grpSpPr>
+        <a:xfrm>
+          <a:off x="0" y="0"/>
+          <a:ext cx="0" cy="0"/>
+          <a:chOff x="0" y="0"/>
+          <a:chExt cx="0" cy="0"/>
+        </a:xfrm>
+      </p:grpSpPr>
+      <p:sp>
+        <p:nvSpPr>
+          <p:cNvPr id="2" name="Title 1">
+            <a:extLst>
+              <a:ext uri="{FF2B5EF4-FFF2-40B4-BE49-F238E27FC236}">
+                <a16:creationId xmlns:a16="http://schemas.microsoft.com/office/drawing/2014/main" id="{0E6BE073-0026-5B27-787A-628585399C0D}"/>
+              </a:ext>
+            </a:extLst>
+          </p:cNvPr>
+          <p:cNvSpPr>
+            <a:spLocks noGrp="1"/>
+          </p:cNvSpPr>
+          <p:nvPr>
+            <p:ph type="title"/>
+          </p:nvPr>
+        </p:nvSpPr>
+        <p:spPr/>
+        <p:txBody>
+          <a:bodyPr/>
+          <a:lstStyle/>
+          <a:p>
+            <a:r>
+              <a:rPr lang="en-US" dirty="0"/>
+              <a:t>The safety of </a:t>
+            </a:r>
+            <a:r>
+              <a:rPr lang="en-US"/>
+              <a:t>a constant</a:t>
+            </a:r>
+            <a:endParaRPr lang="en-US" dirty="0"/>
+          </a:p>
+        </p:txBody>
+      </p:sp>
+      <p:sp>
+        <p:nvSpPr>
+          <p:cNvPr id="3" name="Content Placeholder 2">
+            <a:extLst>
+              <a:ext uri="{FF2B5EF4-FFF2-40B4-BE49-F238E27FC236}">
+                <a16:creationId xmlns:a16="http://schemas.microsoft.com/office/drawing/2014/main" id="{E8BC1E38-9134-1D13-29D7-3B0D47984C5A}"/>
+              </a:ext>
+            </a:extLst>
+          </p:cNvPr>
+          <p:cNvSpPr>
+            <a:spLocks noGrp="1"/>
+          </p:cNvSpPr>
+          <p:nvPr>
+            <p:ph idx="1"/>
+          </p:nvPr>
+        </p:nvSpPr>
+        <p:spPr/>
+        <p:txBody>
+          <a:bodyPr/>
+          <a:lstStyle/>
+          <a:p>
+            <a:r>
+              <a:rPr lang="en-US" dirty="0"/>
+              <a:t>Example uses a max entries “public const”</a:t>
+            </a:r>
+          </a:p>
+          <a:p>
+            <a:endParaRPr lang="en-US" dirty="0"/>
+          </a:p>
+          <a:p>
+            <a:r>
+              <a:rPr lang="en-US" dirty="0"/>
+              <a:t>If that is changes, and is not rebuilt, you’ll have problems</a:t>
+            </a:r>
+          </a:p>
+          <a:p>
+            <a:endParaRPr lang="en-US" dirty="0"/>
+          </a:p>
+          <a:p>
+            <a:r>
+              <a:rPr lang="en-US" dirty="0"/>
+              <a:t>By switching it to read only, you’re forcing it to have to rebuild with the new value when calling it again</a:t>
+            </a:r>
+          </a:p>
+        </p:txBody>
+      </p:sp>
+    </p:spTree>
+    <p:extLst>
+      <p:ext uri="{BB962C8B-B14F-4D97-AF65-F5344CB8AC3E}">
+        <p14:creationId xmlns:p14="http://schemas.microsoft.com/office/powerpoint/2010/main" val="825562988"/>
       </p:ext>
     </p:extLst>
   </p:cSld>

</xml_diff>